<commit_message>
completed the pharmacy powerpoint
</commit_message>
<xml_diff>
--- a/PowerPoints/Phase 2 - Overview/003 An Overview of Pharmacy Claims Data.pptx
+++ b/PowerPoints/Phase 2 - Overview/003 An Overview of Pharmacy Claims Data.pptx
@@ -11,8 +11,7 @@
     <p:sldId id="258" r:id="rId5"/>
     <p:sldId id="259" r:id="rId6"/>
     <p:sldId id="260" r:id="rId7"/>
-    <p:sldId id="261" r:id="rId8"/>
-    <p:sldId id="262" r:id="rId9"/>
+    <p:sldId id="262" r:id="rId8"/>
   </p:sldIdLst>
   <p:sldSz cx="12192000" cy="6858000"/>
   <p:notesSz cx="6858000" cy="9144000"/>
@@ -1679,7 +1678,7 @@
   </p:clrMapOvr>
   <p:extLst>
     <p:ext uri="{DCECCB84-F9BA-43D5-87BE-67443E8EF086}">
-      <p15:sldGuideLst xmlns:p15="http://schemas.microsoft.com/office/powerpoint/2012/main" xmlns=""/>
+      <p15:sldGuideLst xmlns="" xmlns:p15="http://schemas.microsoft.com/office/powerpoint/2012/main"/>
     </p:ext>
   </p:extLst>
 </p:sldLayout>
@@ -2106,7 +2105,7 @@
   </p:clrMapOvr>
   <p:extLst>
     <p:ext uri="{DCECCB84-F9BA-43D5-87BE-67443E8EF086}">
-      <p15:sldGuideLst xmlns:p15="http://schemas.microsoft.com/office/powerpoint/2012/main" xmlns=""/>
+      <p15:sldGuideLst xmlns="" xmlns:p15="http://schemas.microsoft.com/office/powerpoint/2012/main"/>
     </p:ext>
   </p:extLst>
 </p:sldLayout>
@@ -2649,7 +2648,7 @@
   </p:clrMapOvr>
   <p:extLst>
     <p:ext uri="{DCECCB84-F9BA-43D5-87BE-67443E8EF086}">
-      <p15:sldGuideLst xmlns:p15="http://schemas.microsoft.com/office/powerpoint/2012/main" xmlns=""/>
+      <p15:sldGuideLst xmlns="" xmlns:p15="http://schemas.microsoft.com/office/powerpoint/2012/main"/>
     </p:ext>
   </p:extLst>
 </p:sldLayout>
@@ -4195,7 +4194,7 @@
   </p:clrMapOvr>
   <p:extLst>
     <p:ext uri="{DCECCB84-F9BA-43D5-87BE-67443E8EF086}">
-      <p15:sldGuideLst xmlns:p15="http://schemas.microsoft.com/office/powerpoint/2012/main" xmlns=""/>
+      <p15:sldGuideLst xmlns="" xmlns:p15="http://schemas.microsoft.com/office/powerpoint/2012/main"/>
     </p:ext>
   </p:extLst>
 </p:sldLayout>
@@ -4570,7 +4569,7 @@
   </p:clrMapOvr>
   <p:extLst>
     <p:ext uri="{DCECCB84-F9BA-43D5-87BE-67443E8EF086}">
-      <p15:sldGuideLst xmlns:p15="http://schemas.microsoft.com/office/powerpoint/2012/main" xmlns=""/>
+      <p15:sldGuideLst xmlns="" xmlns:p15="http://schemas.microsoft.com/office/powerpoint/2012/main"/>
     </p:ext>
   </p:extLst>
 </p:sldLayout>
@@ -5072,7 +5071,7 @@
   </p:clrMapOvr>
   <p:extLst>
     <p:ext uri="{DCECCB84-F9BA-43D5-87BE-67443E8EF086}">
-      <p15:sldGuideLst xmlns:p15="http://schemas.microsoft.com/office/powerpoint/2012/main" xmlns=""/>
+      <p15:sldGuideLst xmlns="" xmlns:p15="http://schemas.microsoft.com/office/powerpoint/2012/main"/>
     </p:ext>
   </p:extLst>
 </p:sldLayout>
@@ -5871,7 +5870,7 @@
   </p:txStyles>
   <p:extLst>
     <p:ext uri="{27BBF7A9-308A-43DC-89C8-2F10F3537804}">
-      <p15:sldGuideLst xmlns:p15="http://schemas.microsoft.com/office/powerpoint/2012/main" xmlns=""/>
+      <p15:sldGuideLst xmlns="" xmlns:p15="http://schemas.microsoft.com/office/powerpoint/2012/main"/>
     </p:ext>
   </p:extLst>
 </p:sldMaster>
@@ -6568,7 +6567,7 @@
   </p:txStyles>
   <p:extLst>
     <p:ext uri="{27BBF7A9-308A-43DC-89C8-2F10F3537804}">
-      <p15:sldGuideLst xmlns:p15="http://schemas.microsoft.com/office/powerpoint/2012/main" xmlns=""/>
+      <p15:sldGuideLst xmlns="" xmlns:p15="http://schemas.microsoft.com/office/powerpoint/2012/main"/>
     </p:ext>
   </p:extLst>
 </p:sldMaster>
@@ -6682,7 +6681,11 @@
           <a:bodyPr/>
           <a:lstStyle/>
           <a:p>
-            <a:endParaRPr lang="en-US"/>
+            <a:r>
+              <a:rPr lang="en-US" dirty="0" smtClean="0"/>
+              <a:t>Pharmacy Claims</a:t>
+            </a:r>
+            <a:endParaRPr lang="en-US" dirty="0"/>
           </a:p>
         </p:txBody>
       </p:sp>
@@ -6701,6 +6704,42 @@
           <a:bodyPr/>
           <a:lstStyle/>
           <a:p>
+            <a:r>
+              <a:rPr lang="en-US" dirty="0" smtClean="0"/>
+              <a:t>This table included all prescription drugs that the insurance company paid for.</a:t>
+            </a:r>
+          </a:p>
+          <a:p>
+            <a:pPr lvl="1"/>
+            <a:r>
+              <a:rPr lang="en-US" dirty="0" smtClean="0"/>
+              <a:t>Prescriptions that were prescribed but not dispensed are not in the data</a:t>
+            </a:r>
+          </a:p>
+          <a:p>
+            <a:pPr lvl="1"/>
+            <a:r>
+              <a:rPr lang="en-US" dirty="0" smtClean="0"/>
+              <a:t>Low-Cost prescriptions may be missing if the member paid for them out of pocket (i.e. without an insurance claim being filed)</a:t>
+            </a:r>
+          </a:p>
+          <a:p>
+            <a:pPr lvl="1"/>
+            <a:r>
+              <a:rPr lang="en-US" dirty="0" smtClean="0"/>
+              <a:t>Double-counting may occur if a health insurance organization and their third-party pharmacy claims administrator both submit data to the APCD.</a:t>
+            </a:r>
+          </a:p>
+          <a:p>
+            <a:pPr lvl="1"/>
+            <a:r>
+              <a:rPr lang="en-US" dirty="0" smtClean="0"/>
+              <a:t>Prescription drugs administered in hospital or doctors office may be recorded in a medical claim, rather than a pharmacy claim.</a:t>
+            </a:r>
+            <a:endParaRPr lang="en-US" dirty="0" smtClean="0"/>
+          </a:p>
+          <a:p>
+            <a:pPr lvl="1"/>
             <a:endParaRPr lang="en-US" dirty="0"/>
           </a:p>
         </p:txBody>
@@ -6750,7 +6789,19 @@
           <a:bodyPr/>
           <a:lstStyle/>
           <a:p>
-            <a:endParaRPr lang="en-US"/>
+            <a:r>
+              <a:rPr lang="en-US" dirty="0" smtClean="0"/>
+              <a:t>How are Drugs </a:t>
+            </a:r>
+            <a:r>
+              <a:rPr lang="en-US" dirty="0"/>
+              <a:t>I</a:t>
+            </a:r>
+            <a:r>
+              <a:rPr lang="en-US" dirty="0" smtClean="0"/>
+              <a:t>dentified?</a:t>
+            </a:r>
+            <a:endParaRPr lang="en-US" dirty="0"/>
           </a:p>
         </p:txBody>
       </p:sp>
@@ -6769,6 +6820,59 @@
           <a:bodyPr/>
           <a:lstStyle/>
           <a:p>
+            <a:r>
+              <a:rPr lang="en-US" dirty="0" smtClean="0"/>
+              <a:t>A pharmacy claim record will typically include:</a:t>
+            </a:r>
+          </a:p>
+          <a:p>
+            <a:pPr lvl="1"/>
+            <a:r>
+              <a:rPr lang="en-US" dirty="0" smtClean="0"/>
+              <a:t>The drug’s NDC Code and drug name</a:t>
+            </a:r>
+          </a:p>
+          <a:p>
+            <a:pPr lvl="1"/>
+            <a:r>
+              <a:rPr lang="en-US" dirty="0" smtClean="0"/>
+              <a:t>An indicator field that identifies compounded drugs</a:t>
+            </a:r>
+          </a:p>
+          <a:p>
+            <a:pPr lvl="1"/>
+            <a:r>
+              <a:rPr lang="en-US" dirty="0" smtClean="0"/>
+              <a:t>The quantity dispensed and the unit of measurement for that quantity. </a:t>
+            </a:r>
+          </a:p>
+          <a:p>
+            <a:pPr lvl="1"/>
+            <a:r>
+              <a:rPr lang="en-US" dirty="0" smtClean="0"/>
+              <a:t>The “days supply” number.</a:t>
+            </a:r>
+          </a:p>
+          <a:p>
+            <a:pPr lvl="1"/>
+            <a:r>
+              <a:rPr lang="en-US" dirty="0"/>
+              <a:t>A</a:t>
+            </a:r>
+            <a:r>
+              <a:rPr lang="en-US" dirty="0" smtClean="0"/>
+              <a:t>n indicator to show if it’s a new prescription or a refill.</a:t>
+            </a:r>
+          </a:p>
+          <a:p>
+            <a:pPr lvl="1"/>
+            <a:r>
+              <a:rPr lang="en-US" dirty="0" smtClean="0"/>
+              <a:t>An indicator showing if the drug is generic, and if generics are available.</a:t>
+            </a:r>
+          </a:p>
+          <a:p>
+            <a:pPr lvl="1"/>
             <a:endParaRPr lang="en-US" dirty="0"/>
           </a:p>
         </p:txBody>
@@ -6818,7 +6922,11 @@
           <a:bodyPr/>
           <a:lstStyle/>
           <a:p>
-            <a:endParaRPr lang="en-US"/>
+            <a:r>
+              <a:rPr lang="en-US" dirty="0" smtClean="0"/>
+              <a:t>How are Prescriptions Identified?</a:t>
+            </a:r>
+            <a:endParaRPr lang="en-US" dirty="0"/>
           </a:p>
         </p:txBody>
       </p:sp>
@@ -6837,6 +6945,38 @@
           <a:bodyPr/>
           <a:lstStyle/>
           <a:p>
+            <a:r>
+              <a:rPr lang="en-US" dirty="0" smtClean="0"/>
+              <a:t>Each prescription will typically include:</a:t>
+            </a:r>
+          </a:p>
+          <a:p>
+            <a:pPr lvl="1"/>
+            <a:r>
+              <a:rPr lang="en-US" dirty="0" smtClean="0"/>
+              <a:t>The prescribing physician’s name and provider ID number.</a:t>
+            </a:r>
+          </a:p>
+          <a:p>
+            <a:pPr lvl="1"/>
+            <a:r>
+              <a:rPr lang="en-US" dirty="0" smtClean="0"/>
+              <a:t>The prescribing physicians Drug Enforcement Agency number.</a:t>
+            </a:r>
+          </a:p>
+          <a:p>
+            <a:pPr lvl="1"/>
+            <a:r>
+              <a:rPr lang="en-US" dirty="0" smtClean="0"/>
+              <a:t>The date the prescription was written</a:t>
+            </a:r>
+          </a:p>
+          <a:p>
+            <a:pPr lvl="1"/>
+            <a:r>
+              <a:rPr lang="en-US" dirty="0" smtClean="0"/>
+              <a:t>The date the prescription was filled</a:t>
+            </a:r>
             <a:endParaRPr lang="en-US" dirty="0"/>
           </a:p>
         </p:txBody>
@@ -6886,7 +7026,11 @@
           <a:bodyPr/>
           <a:lstStyle/>
           <a:p>
-            <a:endParaRPr lang="en-US"/>
+            <a:r>
+              <a:rPr lang="en-US" dirty="0" smtClean="0"/>
+              <a:t>How are prescriptions paid for?</a:t>
+            </a:r>
+            <a:endParaRPr lang="en-US" dirty="0"/>
           </a:p>
         </p:txBody>
       </p:sp>
@@ -6905,6 +7049,60 @@
           <a:bodyPr/>
           <a:lstStyle/>
           <a:p>
+            <a:r>
+              <a:rPr lang="en-US" dirty="0" smtClean="0"/>
+              <a:t>Pharmacy Claims data breaks down the price into detailed line items:</a:t>
+            </a:r>
+          </a:p>
+          <a:p>
+            <a:pPr lvl="1"/>
+            <a:r>
+              <a:rPr lang="en-US" dirty="0" smtClean="0"/>
+              <a:t>Allowed Amount – The total contractual amount the insurance has agreed to pay.</a:t>
+            </a:r>
+            <a:endParaRPr lang="en-US" dirty="0" smtClean="0"/>
+          </a:p>
+          <a:p>
+            <a:pPr lvl="1"/>
+            <a:r>
+              <a:rPr lang="en-US" dirty="0" smtClean="0"/>
+              <a:t>Charged Amount – The amount the pharmacy billed for the prescription.</a:t>
+            </a:r>
+          </a:p>
+          <a:p>
+            <a:pPr lvl="1"/>
+            <a:r>
+              <a:rPr lang="en-US" dirty="0" smtClean="0"/>
+              <a:t>Paid Amount – The amount actually paid.</a:t>
+            </a:r>
+          </a:p>
+          <a:p>
+            <a:pPr lvl="1"/>
+            <a:r>
+              <a:rPr lang="en-US" dirty="0" smtClean="0"/>
+              <a:t>Ingredient Cost</a:t>
+            </a:r>
+          </a:p>
+          <a:p>
+            <a:pPr lvl="1"/>
+            <a:r>
+              <a:rPr lang="en-US" dirty="0" smtClean="0"/>
+              <a:t>Postage Amount</a:t>
+            </a:r>
+          </a:p>
+          <a:p>
+            <a:pPr lvl="1"/>
+            <a:r>
+              <a:rPr lang="en-US" dirty="0" smtClean="0"/>
+              <a:t>Dispensing Fee</a:t>
+            </a:r>
+          </a:p>
+          <a:p>
+            <a:pPr lvl="1"/>
+            <a:r>
+              <a:rPr lang="en-US" dirty="0" smtClean="0"/>
+              <a:t>State Sales Tax</a:t>
+            </a:r>
             <a:endParaRPr lang="en-US" dirty="0"/>
           </a:p>
         </p:txBody>
@@ -6923,74 +7121,6 @@
 </file>
 
 <file path=ppt/slides/slide6.xml><?xml version="1.0" encoding="utf-8"?>
-<p:sld xmlns:a="http://schemas.openxmlformats.org/drawingml/2006/main" xmlns:r="http://schemas.openxmlformats.org/officeDocument/2006/relationships" xmlns:p="http://schemas.openxmlformats.org/presentationml/2006/main">
-  <p:cSld>
-    <p:spTree>
-      <p:nvGrpSpPr>
-        <p:cNvPr id="1" name=""/>
-        <p:cNvGrpSpPr/>
-        <p:nvPr/>
-      </p:nvGrpSpPr>
-      <p:grpSpPr>
-        <a:xfrm>
-          <a:off x="0" y="0"/>
-          <a:ext cx="0" cy="0"/>
-          <a:chOff x="0" y="0"/>
-          <a:chExt cx="0" cy="0"/>
-        </a:xfrm>
-      </p:grpSpPr>
-      <p:sp>
-        <p:nvSpPr>
-          <p:cNvPr id="2" name="Title 1"/>
-          <p:cNvSpPr>
-            <a:spLocks noGrp="1"/>
-          </p:cNvSpPr>
-          <p:nvPr>
-            <p:ph type="title"/>
-          </p:nvPr>
-        </p:nvSpPr>
-        <p:spPr/>
-        <p:txBody>
-          <a:bodyPr/>
-          <a:lstStyle/>
-          <a:p>
-            <a:endParaRPr lang="en-US"/>
-          </a:p>
-        </p:txBody>
-      </p:sp>
-      <p:sp>
-        <p:nvSpPr>
-          <p:cNvPr id="3" name="Content Placeholder 2"/>
-          <p:cNvSpPr>
-            <a:spLocks noGrp="1"/>
-          </p:cNvSpPr>
-          <p:nvPr>
-            <p:ph idx="1"/>
-          </p:nvPr>
-        </p:nvSpPr>
-        <p:spPr/>
-        <p:txBody>
-          <a:bodyPr/>
-          <a:lstStyle/>
-          <a:p>
-            <a:endParaRPr lang="en-US" dirty="0"/>
-          </a:p>
-        </p:txBody>
-      </p:sp>
-    </p:spTree>
-    <p:extLst>
-      <p:ext uri="{BB962C8B-B14F-4D97-AF65-F5344CB8AC3E}">
-        <p14:creationId xmlns:p14="http://schemas.microsoft.com/office/powerpoint/2010/main" val="1661842399"/>
-      </p:ext>
-    </p:extLst>
-  </p:cSld>
-  <p:clrMapOvr>
-    <a:masterClrMapping/>
-  </p:clrMapOvr>
-</p:sld>
-</file>
-
-<file path=ppt/slides/slide7.xml><?xml version="1.0" encoding="utf-8"?>
 <p:sld xmlns:a="http://schemas.openxmlformats.org/drawingml/2006/main" xmlns:r="http://schemas.openxmlformats.org/officeDocument/2006/relationships" xmlns:p="http://schemas.openxmlformats.org/presentationml/2006/main">
   <p:cSld>
     <p:spTree>
@@ -7577,7 +7707,7 @@
   <a:extraClrSchemeLst/>
   <a:extLst>
     <a:ext uri="{05A4C25C-085E-4340-85A3-A5531E510DB2}">
-      <thm15:themeFamily xmlns:thm15="http://schemas.microsoft.com/office/thememl/2012/main" xmlns="" name="Gallery" id="{BBFCD31E-59A1-489D-B089-A3EAD7CAE12E}" vid="{AC464412-510E-4F2B-8947-A0DDBD028997}"/>
+      <thm15:themeFamily xmlns="" xmlns:thm15="http://schemas.microsoft.com/office/thememl/2012/main" name="Gallery" id="{BBFCD31E-59A1-489D-B089-A3EAD7CAE12E}" vid="{AC464412-510E-4F2B-8947-A0DDBD028997}"/>
     </a:ext>
   </a:extLst>
 </a:theme>

</xml_diff>